<commit_message>
Finished all comments and some bug fixes
</commit_message>
<xml_diff>
--- a/ProductPresentation.pptx
+++ b/ProductPresentation.pptx
@@ -163,8 +163,8 @@
           </a:prstGeom>
           <a:noFill/>
           <a:extLst>
-            <a:ext uri="{909E8E84-426E-40dd-AFC4-6F175D3DCCD1}">
-              <a14:hiddenFill xmlns:a14="http://schemas.microsoft.com/office/drawing/2010/main" xmlns="">
+            <a:ext uri="{909E8E84-426E-40DD-AFC4-6F175D3DCCD1}">
+              <a14:hiddenFill xmlns:a14="http://schemas.microsoft.com/office/drawing/2010/main">
                 <a:solidFill>
                   <a:srgbClr val="FFFFFF"/>
                 </a:solidFill>
@@ -223,8 +223,8 @@
               <a:noFill/>
             </a:ln>
             <a:extLst>
-              <a:ext uri="{91240B29-F687-4f45-9708-019B960494DF}">
-                <a14:hiddenLine xmlns:a14="http://schemas.microsoft.com/office/drawing/2010/main" xmlns="" w="9525">
+              <a:ext uri="{91240B29-F687-4F45-9708-019B960494DF}">
+                <a14:hiddenLine xmlns:a14="http://schemas.microsoft.com/office/drawing/2010/main" w="9525">
                   <a:solidFill>
                     <a:srgbClr val="000000"/>
                   </a:solidFill>
@@ -313,8 +313,8 @@
               <a:noFill/>
             </a:ln>
             <a:extLst>
-              <a:ext uri="{91240B29-F687-4f45-9708-019B960494DF}">
-                <a14:hiddenLine xmlns:a14="http://schemas.microsoft.com/office/drawing/2010/main" xmlns="" w="9525">
+              <a:ext uri="{91240B29-F687-4F45-9708-019B960494DF}">
+                <a14:hiddenLine xmlns:a14="http://schemas.microsoft.com/office/drawing/2010/main" w="9525">
                   <a:solidFill>
                     <a:srgbClr val="000000"/>
                   </a:solidFill>
@@ -403,8 +403,8 @@
               <a:noFill/>
             </a:ln>
             <a:extLst>
-              <a:ext uri="{91240B29-F687-4f45-9708-019B960494DF}">
-                <a14:hiddenLine xmlns:a14="http://schemas.microsoft.com/office/drawing/2010/main" xmlns="" w="9525">
+              <a:ext uri="{91240B29-F687-4F45-9708-019B960494DF}">
+                <a14:hiddenLine xmlns:a14="http://schemas.microsoft.com/office/drawing/2010/main" w="9525">
                   <a:solidFill>
                     <a:srgbClr val="000000"/>
                   </a:solidFill>
@@ -437,8 +437,8 @@
               <a:noFill/>
             </a:ln>
             <a:extLst>
-              <a:ext uri="{91240B29-F687-4f45-9708-019B960494DF}">
-                <a14:hiddenLine xmlns:a14="http://schemas.microsoft.com/office/drawing/2010/main" xmlns="" w="9525">
+              <a:ext uri="{91240B29-F687-4F45-9708-019B960494DF}">
+                <a14:hiddenLine xmlns:a14="http://schemas.microsoft.com/office/drawing/2010/main" w="9525">
                   <a:solidFill>
                     <a:srgbClr val="000000"/>
                   </a:solidFill>
@@ -527,8 +527,8 @@
               <a:noFill/>
             </a:ln>
             <a:extLst>
-              <a:ext uri="{91240B29-F687-4f45-9708-019B960494DF}">
-                <a14:hiddenLine xmlns:a14="http://schemas.microsoft.com/office/drawing/2010/main" xmlns="" w="9525">
+              <a:ext uri="{91240B29-F687-4F45-9708-019B960494DF}">
+                <a14:hiddenLine xmlns:a14="http://schemas.microsoft.com/office/drawing/2010/main" w="9525">
                   <a:solidFill>
                     <a:srgbClr val="000000"/>
                   </a:solidFill>
@@ -589,8 +589,8 @@
               <a:noFill/>
             </a:ln>
             <a:extLst>
-              <a:ext uri="{91240B29-F687-4f45-9708-019B960494DF}">
-                <a14:hiddenLine xmlns:a14="http://schemas.microsoft.com/office/drawing/2010/main" xmlns="" w="9525">
+              <a:ext uri="{91240B29-F687-4F45-9708-019B960494DF}">
+                <a14:hiddenLine xmlns:a14="http://schemas.microsoft.com/office/drawing/2010/main" w="9525">
                   <a:solidFill>
                     <a:srgbClr val="000000"/>
                   </a:solidFill>
@@ -651,8 +651,8 @@
               <a:noFill/>
             </a:ln>
             <a:extLst>
-              <a:ext uri="{91240B29-F687-4f45-9708-019B960494DF}">
-                <a14:hiddenLine xmlns:a14="http://schemas.microsoft.com/office/drawing/2010/main" xmlns="" w="9525">
+              <a:ext uri="{91240B29-F687-4F45-9708-019B960494DF}">
+                <a14:hiddenLine xmlns:a14="http://schemas.microsoft.com/office/drawing/2010/main" w="9525">
                   <a:solidFill>
                     <a:srgbClr val="000000"/>
                   </a:solidFill>
@@ -741,8 +741,8 @@
               <a:noFill/>
             </a:ln>
             <a:extLst>
-              <a:ext uri="{91240B29-F687-4f45-9708-019B960494DF}">
-                <a14:hiddenLine xmlns:a14="http://schemas.microsoft.com/office/drawing/2010/main" xmlns="" w="9525">
+              <a:ext uri="{91240B29-F687-4F45-9708-019B960494DF}">
+                <a14:hiddenLine xmlns:a14="http://schemas.microsoft.com/office/drawing/2010/main" w="9525">
                   <a:solidFill>
                     <a:srgbClr val="000000"/>
                   </a:solidFill>
@@ -803,8 +803,8 @@
               <a:noFill/>
             </a:ln>
             <a:extLst>
-              <a:ext uri="{91240B29-F687-4f45-9708-019B960494DF}">
-                <a14:hiddenLine xmlns:a14="http://schemas.microsoft.com/office/drawing/2010/main" xmlns="" w="9525">
+              <a:ext uri="{91240B29-F687-4F45-9708-019B960494DF}">
+                <a14:hiddenLine xmlns:a14="http://schemas.microsoft.com/office/drawing/2010/main" w="9525">
                   <a:solidFill>
                     <a:srgbClr val="000000"/>
                   </a:solidFill>
@@ -865,8 +865,8 @@
               <a:noFill/>
             </a:ln>
             <a:extLst>
-              <a:ext uri="{91240B29-F687-4f45-9708-019B960494DF}">
-                <a14:hiddenLine xmlns:a14="http://schemas.microsoft.com/office/drawing/2010/main" xmlns="" w="9525">
+              <a:ext uri="{91240B29-F687-4F45-9708-019B960494DF}">
+                <a14:hiddenLine xmlns:a14="http://schemas.microsoft.com/office/drawing/2010/main" w="9525">
                   <a:solidFill>
                     <a:srgbClr val="000000"/>
                   </a:solidFill>
@@ -955,8 +955,8 @@
               <a:noFill/>
             </a:ln>
             <a:extLst>
-              <a:ext uri="{91240B29-F687-4f45-9708-019B960494DF}">
-                <a14:hiddenLine xmlns:a14="http://schemas.microsoft.com/office/drawing/2010/main" xmlns="" w="9525">
+              <a:ext uri="{91240B29-F687-4F45-9708-019B960494DF}">
+                <a14:hiddenLine xmlns:a14="http://schemas.microsoft.com/office/drawing/2010/main" w="9525">
                   <a:solidFill>
                     <a:srgbClr val="000000"/>
                   </a:solidFill>
@@ -1045,8 +1045,8 @@
               <a:noFill/>
             </a:ln>
             <a:extLst>
-              <a:ext uri="{91240B29-F687-4f45-9708-019B960494DF}">
-                <a14:hiddenLine xmlns:a14="http://schemas.microsoft.com/office/drawing/2010/main" xmlns="" w="9525">
+              <a:ext uri="{91240B29-F687-4F45-9708-019B960494DF}">
+                <a14:hiddenLine xmlns:a14="http://schemas.microsoft.com/office/drawing/2010/main" w="9525">
                   <a:solidFill>
                     <a:srgbClr val="000000"/>
                   </a:solidFill>
@@ -1107,8 +1107,8 @@
               <a:noFill/>
             </a:ln>
             <a:extLst>
-              <a:ext uri="{91240B29-F687-4f45-9708-019B960494DF}">
-                <a14:hiddenLine xmlns:a14="http://schemas.microsoft.com/office/drawing/2010/main" xmlns="" w="9525">
+              <a:ext uri="{91240B29-F687-4F45-9708-019B960494DF}">
+                <a14:hiddenLine xmlns:a14="http://schemas.microsoft.com/office/drawing/2010/main" w="9525">
                   <a:solidFill>
                     <a:srgbClr val="000000"/>
                   </a:solidFill>
@@ -1217,8 +1217,8 @@
               <a:noFill/>
             </a:ln>
             <a:extLst>
-              <a:ext uri="{91240B29-F687-4f45-9708-019B960494DF}">
-                <a14:hiddenLine xmlns:a14="http://schemas.microsoft.com/office/drawing/2010/main" xmlns="" w="9525">
+              <a:ext uri="{91240B29-F687-4F45-9708-019B960494DF}">
+                <a14:hiddenLine xmlns:a14="http://schemas.microsoft.com/office/drawing/2010/main" w="9525">
                   <a:solidFill>
                     <a:srgbClr val="000000"/>
                   </a:solidFill>
@@ -1279,8 +1279,8 @@
               <a:noFill/>
             </a:ln>
             <a:extLst>
-              <a:ext uri="{91240B29-F687-4f45-9708-019B960494DF}">
-                <a14:hiddenLine xmlns:a14="http://schemas.microsoft.com/office/drawing/2010/main" xmlns="" w="9525">
+              <a:ext uri="{91240B29-F687-4F45-9708-019B960494DF}">
+                <a14:hiddenLine xmlns:a14="http://schemas.microsoft.com/office/drawing/2010/main" w="9525">
                   <a:solidFill>
                     <a:srgbClr val="000000"/>
                   </a:solidFill>
@@ -1369,8 +1369,8 @@
               <a:noFill/>
             </a:ln>
             <a:extLst>
-              <a:ext uri="{91240B29-F687-4f45-9708-019B960494DF}">
-                <a14:hiddenLine xmlns:a14="http://schemas.microsoft.com/office/drawing/2010/main" xmlns="" w="9525">
+              <a:ext uri="{91240B29-F687-4F45-9708-019B960494DF}">
+                <a14:hiddenLine xmlns:a14="http://schemas.microsoft.com/office/drawing/2010/main" w="9525">
                   <a:solidFill>
                     <a:srgbClr val="000000"/>
                   </a:solidFill>
@@ -1459,8 +1459,8 @@
               <a:noFill/>
             </a:ln>
             <a:extLst>
-              <a:ext uri="{91240B29-F687-4f45-9708-019B960494DF}">
-                <a14:hiddenLine xmlns:a14="http://schemas.microsoft.com/office/drawing/2010/main" xmlns="" w="9525">
+              <a:ext uri="{91240B29-F687-4F45-9708-019B960494DF}">
+                <a14:hiddenLine xmlns:a14="http://schemas.microsoft.com/office/drawing/2010/main" w="9525">
                   <a:solidFill>
                     <a:srgbClr val="000000"/>
                   </a:solidFill>
@@ -1521,8 +1521,8 @@
               <a:noFill/>
             </a:ln>
             <a:extLst>
-              <a:ext uri="{91240B29-F687-4f45-9708-019B960494DF}">
-                <a14:hiddenLine xmlns:a14="http://schemas.microsoft.com/office/drawing/2010/main" xmlns="" w="9525">
+              <a:ext uri="{91240B29-F687-4F45-9708-019B960494DF}">
+                <a14:hiddenLine xmlns:a14="http://schemas.microsoft.com/office/drawing/2010/main" w="9525">
                   <a:solidFill>
                     <a:srgbClr val="000000"/>
                   </a:solidFill>
@@ -1611,8 +1611,8 @@
               <a:noFill/>
             </a:ln>
             <a:extLst>
-              <a:ext uri="{91240B29-F687-4f45-9708-019B960494DF}">
-                <a14:hiddenLine xmlns:a14="http://schemas.microsoft.com/office/drawing/2010/main" xmlns="" w="9525">
+              <a:ext uri="{91240B29-F687-4F45-9708-019B960494DF}">
+                <a14:hiddenLine xmlns:a14="http://schemas.microsoft.com/office/drawing/2010/main" w="9525">
                   <a:solidFill>
                     <a:srgbClr val="000000"/>
                   </a:solidFill>
@@ -1701,8 +1701,8 @@
               <a:noFill/>
             </a:ln>
             <a:extLst>
-              <a:ext uri="{91240B29-F687-4f45-9708-019B960494DF}">
-                <a14:hiddenLine xmlns:a14="http://schemas.microsoft.com/office/drawing/2010/main" xmlns="" w="9525">
+              <a:ext uri="{91240B29-F687-4F45-9708-019B960494DF}">
+                <a14:hiddenLine xmlns:a14="http://schemas.microsoft.com/office/drawing/2010/main" w="9525">
                   <a:solidFill>
                     <a:srgbClr val="000000"/>
                   </a:solidFill>
@@ -1757,8 +1757,8 @@
               <a:noFill/>
             </a:ln>
             <a:extLst>
-              <a:ext uri="{91240B29-F687-4f45-9708-019B960494DF}">
-                <a14:hiddenLine xmlns:a14="http://schemas.microsoft.com/office/drawing/2010/main" xmlns="" w="9525">
+              <a:ext uri="{91240B29-F687-4F45-9708-019B960494DF}">
+                <a14:hiddenLine xmlns:a14="http://schemas.microsoft.com/office/drawing/2010/main" w="9525">
                   <a:solidFill>
                     <a:srgbClr val="000000"/>
                   </a:solidFill>
@@ -1847,8 +1847,8 @@
               <a:noFill/>
             </a:ln>
             <a:extLst>
-              <a:ext uri="{91240B29-F687-4f45-9708-019B960494DF}">
-                <a14:hiddenLine xmlns:a14="http://schemas.microsoft.com/office/drawing/2010/main" xmlns="" w="9525">
+              <a:ext uri="{91240B29-F687-4F45-9708-019B960494DF}">
+                <a14:hiddenLine xmlns:a14="http://schemas.microsoft.com/office/drawing/2010/main" w="9525">
                   <a:solidFill>
                     <a:srgbClr val="000000"/>
                   </a:solidFill>
@@ -1903,8 +1903,8 @@
               <a:noFill/>
             </a:ln>
             <a:extLst>
-              <a:ext uri="{91240B29-F687-4f45-9708-019B960494DF}">
-                <a14:hiddenLine xmlns:a14="http://schemas.microsoft.com/office/drawing/2010/main" xmlns="" w="9525">
+              <a:ext uri="{91240B29-F687-4F45-9708-019B960494DF}">
+                <a14:hiddenLine xmlns:a14="http://schemas.microsoft.com/office/drawing/2010/main" w="9525">
                   <a:solidFill>
                     <a:srgbClr val="000000"/>
                   </a:solidFill>
@@ -1993,8 +1993,8 @@
               <a:noFill/>
             </a:ln>
             <a:extLst>
-              <a:ext uri="{91240B29-F687-4f45-9708-019B960494DF}">
-                <a14:hiddenLine xmlns:a14="http://schemas.microsoft.com/office/drawing/2010/main" xmlns="" w="9525">
+              <a:ext uri="{91240B29-F687-4F45-9708-019B960494DF}">
+                <a14:hiddenLine xmlns:a14="http://schemas.microsoft.com/office/drawing/2010/main" w="9525">
                   <a:solidFill>
                     <a:srgbClr val="000000"/>
                   </a:solidFill>
@@ -2061,8 +2061,8 @@
               <a:noFill/>
             </a:ln>
             <a:extLst>
-              <a:ext uri="{91240B29-F687-4f45-9708-019B960494DF}">
-                <a14:hiddenLine xmlns:a14="http://schemas.microsoft.com/office/drawing/2010/main" xmlns="" w="9525">
+              <a:ext uri="{91240B29-F687-4F45-9708-019B960494DF}">
+                <a14:hiddenLine xmlns:a14="http://schemas.microsoft.com/office/drawing/2010/main" w="9525">
                   <a:solidFill>
                     <a:srgbClr val="000000"/>
                   </a:solidFill>
@@ -2151,8 +2151,8 @@
               <a:noFill/>
             </a:ln>
             <a:extLst>
-              <a:ext uri="{91240B29-F687-4f45-9708-019B960494DF}">
-                <a14:hiddenLine xmlns:a14="http://schemas.microsoft.com/office/drawing/2010/main" xmlns="" w="9525">
+              <a:ext uri="{91240B29-F687-4F45-9708-019B960494DF}">
+                <a14:hiddenLine xmlns:a14="http://schemas.microsoft.com/office/drawing/2010/main" w="9525">
                   <a:solidFill>
                     <a:srgbClr val="000000"/>
                   </a:solidFill>
@@ -2219,8 +2219,8 @@
               <a:noFill/>
             </a:ln>
             <a:extLst>
-              <a:ext uri="{91240B29-F687-4f45-9708-019B960494DF}">
-                <a14:hiddenLine xmlns:a14="http://schemas.microsoft.com/office/drawing/2010/main" xmlns="" w="9525">
+              <a:ext uri="{91240B29-F687-4F45-9708-019B960494DF}">
+                <a14:hiddenLine xmlns:a14="http://schemas.microsoft.com/office/drawing/2010/main" w="9525">
                   <a:solidFill>
                     <a:srgbClr val="000000"/>
                   </a:solidFill>
@@ -2309,8 +2309,8 @@
               <a:noFill/>
             </a:ln>
             <a:extLst>
-              <a:ext uri="{91240B29-F687-4f45-9708-019B960494DF}">
-                <a14:hiddenLine xmlns:a14="http://schemas.microsoft.com/office/drawing/2010/main" xmlns="" w="9525">
+              <a:ext uri="{91240B29-F687-4F45-9708-019B960494DF}">
+                <a14:hiddenLine xmlns:a14="http://schemas.microsoft.com/office/drawing/2010/main" w="9525">
                   <a:solidFill>
                     <a:srgbClr val="000000"/>
                   </a:solidFill>
@@ -2343,8 +2343,8 @@
               <a:noFill/>
             </a:ln>
             <a:extLst>
-              <a:ext uri="{91240B29-F687-4f45-9708-019B960494DF}">
-                <a14:hiddenLine xmlns:a14="http://schemas.microsoft.com/office/drawing/2010/main" xmlns="" w="9525">
+              <a:ext uri="{91240B29-F687-4F45-9708-019B960494DF}">
+                <a14:hiddenLine xmlns:a14="http://schemas.microsoft.com/office/drawing/2010/main" w="9525">
                   <a:solidFill>
                     <a:srgbClr val="000000"/>
                   </a:solidFill>
@@ -2433,8 +2433,8 @@
               <a:noFill/>
             </a:ln>
             <a:extLst>
-              <a:ext uri="{91240B29-F687-4f45-9708-019B960494DF}">
-                <a14:hiddenLine xmlns:a14="http://schemas.microsoft.com/office/drawing/2010/main" xmlns="" w="9525">
+              <a:ext uri="{91240B29-F687-4F45-9708-019B960494DF}">
+                <a14:hiddenLine xmlns:a14="http://schemas.microsoft.com/office/drawing/2010/main" w="9525">
                   <a:solidFill>
                     <a:srgbClr val="000000"/>
                   </a:solidFill>
@@ -2495,8 +2495,8 @@
               <a:noFill/>
             </a:ln>
             <a:extLst>
-              <a:ext uri="{91240B29-F687-4f45-9708-019B960494DF}">
-                <a14:hiddenLine xmlns:a14="http://schemas.microsoft.com/office/drawing/2010/main" xmlns="" w="9525">
+              <a:ext uri="{91240B29-F687-4F45-9708-019B960494DF}">
+                <a14:hiddenLine xmlns:a14="http://schemas.microsoft.com/office/drawing/2010/main" w="9525">
                   <a:solidFill>
                     <a:srgbClr val="000000"/>
                   </a:solidFill>
@@ -2557,8 +2557,8 @@
               <a:noFill/>
             </a:ln>
             <a:extLst>
-              <a:ext uri="{91240B29-F687-4f45-9708-019B960494DF}">
-                <a14:hiddenLine xmlns:a14="http://schemas.microsoft.com/office/drawing/2010/main" xmlns="" w="9525">
+              <a:ext uri="{91240B29-F687-4F45-9708-019B960494DF}">
+                <a14:hiddenLine xmlns:a14="http://schemas.microsoft.com/office/drawing/2010/main" w="9525">
                   <a:solidFill>
                     <a:srgbClr val="000000"/>
                   </a:solidFill>
@@ -2647,8 +2647,8 @@
               <a:noFill/>
             </a:ln>
             <a:extLst>
-              <a:ext uri="{91240B29-F687-4f45-9708-019B960494DF}">
-                <a14:hiddenLine xmlns:a14="http://schemas.microsoft.com/office/drawing/2010/main" xmlns="" w="9525">
+              <a:ext uri="{91240B29-F687-4F45-9708-019B960494DF}">
+                <a14:hiddenLine xmlns:a14="http://schemas.microsoft.com/office/drawing/2010/main" w="9525">
                   <a:solidFill>
                     <a:srgbClr val="000000"/>
                   </a:solidFill>
@@ -2715,8 +2715,8 @@
               <a:noFill/>
             </a:ln>
             <a:extLst>
-              <a:ext uri="{91240B29-F687-4f45-9708-019B960494DF}">
-                <a14:hiddenLine xmlns:a14="http://schemas.microsoft.com/office/drawing/2010/main" xmlns="" w="9525">
+              <a:ext uri="{91240B29-F687-4F45-9708-019B960494DF}">
+                <a14:hiddenLine xmlns:a14="http://schemas.microsoft.com/office/drawing/2010/main" w="9525">
                   <a:solidFill>
                     <a:srgbClr val="000000"/>
                   </a:solidFill>
@@ -2777,8 +2777,8 @@
               <a:noFill/>
             </a:ln>
             <a:extLst>
-              <a:ext uri="{91240B29-F687-4f45-9708-019B960494DF}">
-                <a14:hiddenLine xmlns:a14="http://schemas.microsoft.com/office/drawing/2010/main" xmlns="" w="9525">
+              <a:ext uri="{91240B29-F687-4F45-9708-019B960494DF}">
+                <a14:hiddenLine xmlns:a14="http://schemas.microsoft.com/office/drawing/2010/main" w="9525">
                   <a:solidFill>
                     <a:srgbClr val="000000"/>
                   </a:solidFill>
@@ -2867,8 +2867,8 @@
               <a:noFill/>
             </a:ln>
             <a:extLst>
-              <a:ext uri="{91240B29-F687-4f45-9708-019B960494DF}">
-                <a14:hiddenLine xmlns:a14="http://schemas.microsoft.com/office/drawing/2010/main" xmlns="" w="9525">
+              <a:ext uri="{91240B29-F687-4F45-9708-019B960494DF}">
+                <a14:hiddenLine xmlns:a14="http://schemas.microsoft.com/office/drawing/2010/main" w="9525">
                   <a:solidFill>
                     <a:srgbClr val="000000"/>
                   </a:solidFill>
@@ -2929,8 +2929,8 @@
               <a:noFill/>
             </a:ln>
             <a:extLst>
-              <a:ext uri="{91240B29-F687-4f45-9708-019B960494DF}">
-                <a14:hiddenLine xmlns:a14="http://schemas.microsoft.com/office/drawing/2010/main" xmlns="" w="9525">
+              <a:ext uri="{91240B29-F687-4F45-9708-019B960494DF}">
+                <a14:hiddenLine xmlns:a14="http://schemas.microsoft.com/office/drawing/2010/main" w="9525">
                   <a:solidFill>
                     <a:srgbClr val="000000"/>
                   </a:solidFill>
@@ -3019,8 +3019,8 @@
               <a:noFill/>
             </a:ln>
             <a:extLst>
-              <a:ext uri="{91240B29-F687-4f45-9708-019B960494DF}">
-                <a14:hiddenLine xmlns:a14="http://schemas.microsoft.com/office/drawing/2010/main" xmlns="" w="9525">
+              <a:ext uri="{91240B29-F687-4F45-9708-019B960494DF}">
+                <a14:hiddenLine xmlns:a14="http://schemas.microsoft.com/office/drawing/2010/main" w="9525">
                   <a:solidFill>
                     <a:srgbClr val="000000"/>
                   </a:solidFill>
@@ -3081,8 +3081,8 @@
               <a:noFill/>
             </a:ln>
             <a:extLst>
-              <a:ext uri="{91240B29-F687-4f45-9708-019B960494DF}">
-                <a14:hiddenLine xmlns:a14="http://schemas.microsoft.com/office/drawing/2010/main" xmlns="" w="9525">
+              <a:ext uri="{91240B29-F687-4F45-9708-019B960494DF}">
+                <a14:hiddenLine xmlns:a14="http://schemas.microsoft.com/office/drawing/2010/main" w="9525">
                   <a:solidFill>
                     <a:srgbClr val="000000"/>
                   </a:solidFill>
@@ -3171,8 +3171,8 @@
               <a:noFill/>
             </a:ln>
             <a:extLst>
-              <a:ext uri="{91240B29-F687-4f45-9708-019B960494DF}">
-                <a14:hiddenLine xmlns:a14="http://schemas.microsoft.com/office/drawing/2010/main" xmlns="" w="9525">
+              <a:ext uri="{91240B29-F687-4F45-9708-019B960494DF}">
+                <a14:hiddenLine xmlns:a14="http://schemas.microsoft.com/office/drawing/2010/main" w="9525">
                   <a:solidFill>
                     <a:srgbClr val="000000"/>
                   </a:solidFill>
@@ -3205,8 +3205,8 @@
               <a:noFill/>
             </a:ln>
             <a:extLst>
-              <a:ext uri="{91240B29-F687-4f45-9708-019B960494DF}">
-                <a14:hiddenLine xmlns:a14="http://schemas.microsoft.com/office/drawing/2010/main" xmlns="" w="9525">
+              <a:ext uri="{91240B29-F687-4F45-9708-019B960494DF}">
+                <a14:hiddenLine xmlns:a14="http://schemas.microsoft.com/office/drawing/2010/main" w="9525">
                   <a:solidFill>
                     <a:srgbClr val="000000"/>
                   </a:solidFill>
@@ -3270,8 +3270,8 @@
               <a:noFill/>
             </a:ln>
             <a:extLst>
-              <a:ext uri="{91240B29-F687-4f45-9708-019B960494DF}">
-                <a14:hiddenLine xmlns:a14="http://schemas.microsoft.com/office/drawing/2010/main" xmlns="" w="9525">
+              <a:ext uri="{91240B29-F687-4F45-9708-019B960494DF}">
+                <a14:hiddenLine xmlns:a14="http://schemas.microsoft.com/office/drawing/2010/main" w="9525">
                   <a:solidFill>
                     <a:srgbClr val="000000"/>
                   </a:solidFill>
@@ -3360,8 +3360,8 @@
               <a:noFill/>
             </a:ln>
             <a:extLst>
-              <a:ext uri="{91240B29-F687-4f45-9708-019B960494DF}">
-                <a14:hiddenLine xmlns:a14="http://schemas.microsoft.com/office/drawing/2010/main" xmlns="" w="9525">
+              <a:ext uri="{91240B29-F687-4F45-9708-019B960494DF}">
+                <a14:hiddenLine xmlns:a14="http://schemas.microsoft.com/office/drawing/2010/main" w="9525">
                   <a:solidFill>
                     <a:srgbClr val="000000"/>
                   </a:solidFill>
@@ -3422,8 +3422,8 @@
               <a:noFill/>
             </a:ln>
             <a:extLst>
-              <a:ext uri="{91240B29-F687-4f45-9708-019B960494DF}">
-                <a14:hiddenLine xmlns:a14="http://schemas.microsoft.com/office/drawing/2010/main" xmlns="" w="9525">
+              <a:ext uri="{91240B29-F687-4F45-9708-019B960494DF}">
+                <a14:hiddenLine xmlns:a14="http://schemas.microsoft.com/office/drawing/2010/main" w="9525">
                   <a:solidFill>
                     <a:srgbClr val="000000"/>
                   </a:solidFill>
@@ -3512,8 +3512,8 @@
               <a:noFill/>
             </a:ln>
             <a:extLst>
-              <a:ext uri="{91240B29-F687-4f45-9708-019B960494DF}">
-                <a14:hiddenLine xmlns:a14="http://schemas.microsoft.com/office/drawing/2010/main" xmlns="" w="9525">
+              <a:ext uri="{91240B29-F687-4F45-9708-019B960494DF}">
+                <a14:hiddenLine xmlns:a14="http://schemas.microsoft.com/office/drawing/2010/main" w="9525">
                   <a:solidFill>
                     <a:srgbClr val="000000"/>
                   </a:solidFill>
@@ -3602,8 +3602,8 @@
               <a:noFill/>
             </a:ln>
             <a:extLst>
-              <a:ext uri="{91240B29-F687-4f45-9708-019B960494DF}">
-                <a14:hiddenLine xmlns:a14="http://schemas.microsoft.com/office/drawing/2010/main" xmlns="" w="9525">
+              <a:ext uri="{91240B29-F687-4F45-9708-019B960494DF}">
+                <a14:hiddenLine xmlns:a14="http://schemas.microsoft.com/office/drawing/2010/main" w="9525">
                   <a:solidFill>
                     <a:srgbClr val="000000"/>
                   </a:solidFill>
@@ -3667,8 +3667,8 @@
               <a:noFill/>
             </a:ln>
             <a:extLst>
-              <a:ext uri="{91240B29-F687-4f45-9708-019B960494DF}">
-                <a14:hiddenLine xmlns:a14="http://schemas.microsoft.com/office/drawing/2010/main" xmlns="" w="9525">
+              <a:ext uri="{91240B29-F687-4F45-9708-019B960494DF}">
+                <a14:hiddenLine xmlns:a14="http://schemas.microsoft.com/office/drawing/2010/main" w="9525">
                   <a:solidFill>
                     <a:srgbClr val="000000"/>
                   </a:solidFill>
@@ -3729,8 +3729,8 @@
               <a:noFill/>
             </a:ln>
             <a:extLst>
-              <a:ext uri="{91240B29-F687-4f45-9708-019B960494DF}">
-                <a14:hiddenLine xmlns:a14="http://schemas.microsoft.com/office/drawing/2010/main" xmlns="" w="9525">
+              <a:ext uri="{91240B29-F687-4F45-9708-019B960494DF}">
+                <a14:hiddenLine xmlns:a14="http://schemas.microsoft.com/office/drawing/2010/main" w="9525">
                   <a:solidFill>
                     <a:srgbClr val="000000"/>
                   </a:solidFill>
@@ -3819,8 +3819,8 @@
               <a:noFill/>
             </a:ln>
             <a:extLst>
-              <a:ext uri="{91240B29-F687-4f45-9708-019B960494DF}">
-                <a14:hiddenLine xmlns:a14="http://schemas.microsoft.com/office/drawing/2010/main" xmlns="" w="9525">
+              <a:ext uri="{91240B29-F687-4F45-9708-019B960494DF}">
+                <a14:hiddenLine xmlns:a14="http://schemas.microsoft.com/office/drawing/2010/main" w="9525">
                   <a:solidFill>
                     <a:srgbClr val="000000"/>
                   </a:solidFill>
@@ -3909,8 +3909,8 @@
               <a:noFill/>
             </a:ln>
             <a:extLst>
-              <a:ext uri="{91240B29-F687-4f45-9708-019B960494DF}">
-                <a14:hiddenLine xmlns:a14="http://schemas.microsoft.com/office/drawing/2010/main" xmlns="" w="9525">
+              <a:ext uri="{91240B29-F687-4F45-9708-019B960494DF}">
+                <a14:hiddenLine xmlns:a14="http://schemas.microsoft.com/office/drawing/2010/main" w="9525">
                   <a:solidFill>
                     <a:srgbClr val="000000"/>
                   </a:solidFill>
@@ -3971,8 +3971,8 @@
               <a:noFill/>
             </a:ln>
             <a:extLst>
-              <a:ext uri="{91240B29-F687-4f45-9708-019B960494DF}">
-                <a14:hiddenLine xmlns:a14="http://schemas.microsoft.com/office/drawing/2010/main" xmlns="" w="9525">
+              <a:ext uri="{91240B29-F687-4F45-9708-019B960494DF}">
+                <a14:hiddenLine xmlns:a14="http://schemas.microsoft.com/office/drawing/2010/main" w="9525">
                   <a:solidFill>
                     <a:srgbClr val="000000"/>
                   </a:solidFill>
@@ -4091,8 +4091,8 @@
               <a:noFill/>
             </a:ln>
             <a:extLst>
-              <a:ext uri="{91240B29-F687-4f45-9708-019B960494DF}">
-                <a14:hiddenLine xmlns:a14="http://schemas.microsoft.com/office/drawing/2010/main" xmlns="" w="9525">
+              <a:ext uri="{91240B29-F687-4F45-9708-019B960494DF}">
+                <a14:hiddenLine xmlns:a14="http://schemas.microsoft.com/office/drawing/2010/main" w="9525">
                   <a:solidFill>
                     <a:srgbClr val="000000"/>
                   </a:solidFill>
@@ -4159,8 +4159,8 @@
               <a:noFill/>
             </a:ln>
             <a:extLst>
-              <a:ext uri="{91240B29-F687-4f45-9708-019B960494DF}">
-                <a14:hiddenLine xmlns:a14="http://schemas.microsoft.com/office/drawing/2010/main" xmlns="" w="9525">
+              <a:ext uri="{91240B29-F687-4F45-9708-019B960494DF}">
+                <a14:hiddenLine xmlns:a14="http://schemas.microsoft.com/office/drawing/2010/main" w="9525">
                   <a:solidFill>
                     <a:srgbClr val="000000"/>
                   </a:solidFill>
@@ -4249,8 +4249,8 @@
               <a:noFill/>
             </a:ln>
             <a:extLst>
-              <a:ext uri="{91240B29-F687-4f45-9708-019B960494DF}">
-                <a14:hiddenLine xmlns:a14="http://schemas.microsoft.com/office/drawing/2010/main" xmlns="" w="9525">
+              <a:ext uri="{91240B29-F687-4F45-9708-019B960494DF}">
+                <a14:hiddenLine xmlns:a14="http://schemas.microsoft.com/office/drawing/2010/main" w="9525">
                   <a:solidFill>
                     <a:srgbClr val="000000"/>
                   </a:solidFill>
@@ -4390,7 +4390,7 @@
           <a:p>
             <a:fld id="{48A87A34-81AB-432B-8DAE-1953F412C126}" type="datetimeFigureOut">
               <a:rPr lang="en-US" dirty="0"/>
-              <a:t>9/17/2016</a:t>
+              <a:t>9/18/2016</a:t>
             </a:fld>
             <a:endParaRPr lang="en-US" dirty="0"/>
           </a:p>
@@ -4652,7 +4652,7 @@
           <a:p>
             <a:fld id="{48A87A34-81AB-432B-8DAE-1953F412C126}" type="datetimeFigureOut">
               <a:rPr lang="en-US" dirty="0"/>
-              <a:t>9/17/2016</a:t>
+              <a:t>9/18/2016</a:t>
             </a:fld>
             <a:endParaRPr lang="en-US" dirty="0"/>
           </a:p>
@@ -4843,7 +4843,7 @@
           <a:p>
             <a:fld id="{48A87A34-81AB-432B-8DAE-1953F412C126}" type="datetimeFigureOut">
               <a:rPr lang="en-US" dirty="0"/>
-              <a:t>9/17/2016</a:t>
+              <a:t>9/18/2016</a:t>
             </a:fld>
             <a:endParaRPr lang="en-US" dirty="0"/>
           </a:p>
@@ -5101,7 +5101,7 @@
           <a:p>
             <a:fld id="{48A87A34-81AB-432B-8DAE-1953F412C126}" type="datetimeFigureOut">
               <a:rPr lang="en-US" dirty="0"/>
-              <a:t>9/17/2016</a:t>
+              <a:t>9/18/2016</a:t>
             </a:fld>
             <a:endParaRPr lang="en-US" dirty="0"/>
           </a:p>
@@ -5530,7 +5530,7 @@
           <a:p>
             <a:fld id="{48A87A34-81AB-432B-8DAE-1953F412C126}" type="datetimeFigureOut">
               <a:rPr lang="en-US" dirty="0"/>
-              <a:t>9/17/2016</a:t>
+              <a:t>9/18/2016</a:t>
             </a:fld>
             <a:endParaRPr lang="en-US" dirty="0"/>
           </a:p>
@@ -6071,7 +6071,7 @@
           <a:p>
             <a:fld id="{48A87A34-81AB-432B-8DAE-1953F412C126}" type="datetimeFigureOut">
               <a:rPr lang="en-US" dirty="0"/>
-              <a:t>9/17/2016</a:t>
+              <a:t>9/18/2016</a:t>
             </a:fld>
             <a:endParaRPr lang="en-US" dirty="0"/>
           </a:p>
@@ -6786,7 +6786,7 @@
           <a:p>
             <a:fld id="{48A87A34-81AB-432B-8DAE-1953F412C126}" type="datetimeFigureOut">
               <a:rPr lang="en-US" dirty="0"/>
-              <a:t>9/17/2016</a:t>
+              <a:t>9/18/2016</a:t>
             </a:fld>
             <a:endParaRPr lang="en-US" dirty="0"/>
           </a:p>
@@ -6951,7 +6951,7 @@
           <a:p>
             <a:fld id="{48A87A34-81AB-432B-8DAE-1953F412C126}" type="datetimeFigureOut">
               <a:rPr lang="en-US" dirty="0"/>
-              <a:t>9/17/2016</a:t>
+              <a:t>9/18/2016</a:t>
             </a:fld>
             <a:endParaRPr lang="en-US" dirty="0"/>
           </a:p>
@@ -7126,7 +7126,7 @@
           <a:p>
             <a:fld id="{48A87A34-81AB-432B-8DAE-1953F412C126}" type="datetimeFigureOut">
               <a:rPr lang="en-US" dirty="0"/>
-              <a:t>9/17/2016</a:t>
+              <a:t>9/18/2016</a:t>
             </a:fld>
             <a:endParaRPr lang="en-US" dirty="0"/>
           </a:p>
@@ -7291,7 +7291,7 @@
           <a:p>
             <a:fld id="{48A87A34-81AB-432B-8DAE-1953F412C126}" type="datetimeFigureOut">
               <a:rPr lang="en-US" dirty="0"/>
-              <a:t>9/17/2016</a:t>
+              <a:t>9/18/2016</a:t>
             </a:fld>
             <a:endParaRPr lang="en-US" dirty="0"/>
           </a:p>
@@ -7536,7 +7536,7 @@
           <a:p>
             <a:fld id="{48A87A34-81AB-432B-8DAE-1953F412C126}" type="datetimeFigureOut">
               <a:rPr lang="en-US" dirty="0"/>
-              <a:t>9/17/2016</a:t>
+              <a:t>9/18/2016</a:t>
             </a:fld>
             <a:endParaRPr lang="en-US" dirty="0"/>
           </a:p>
@@ -7763,7 +7763,7 @@
           <a:p>
             <a:fld id="{48A87A34-81AB-432B-8DAE-1953F412C126}" type="datetimeFigureOut">
               <a:rPr lang="en-US" dirty="0"/>
-              <a:t>9/17/2016</a:t>
+              <a:t>9/18/2016</a:t>
             </a:fld>
             <a:endParaRPr lang="en-US" dirty="0"/>
           </a:p>
@@ -8139,7 +8139,7 @@
           <a:p>
             <a:fld id="{48A87A34-81AB-432B-8DAE-1953F412C126}" type="datetimeFigureOut">
               <a:rPr lang="en-US" dirty="0"/>
-              <a:t>9/17/2016</a:t>
+              <a:t>9/18/2016</a:t>
             </a:fld>
             <a:endParaRPr lang="en-US" dirty="0"/>
           </a:p>
@@ -8252,7 +8252,7 @@
           <a:p>
             <a:fld id="{48A87A34-81AB-432B-8DAE-1953F412C126}" type="datetimeFigureOut">
               <a:rPr lang="en-US" dirty="0"/>
-              <a:t>9/17/2016</a:t>
+              <a:t>9/18/2016</a:t>
             </a:fld>
             <a:endParaRPr lang="en-US" dirty="0"/>
           </a:p>
@@ -8342,7 +8342,7 @@
           <a:p>
             <a:fld id="{48A87A34-81AB-432B-8DAE-1953F412C126}" type="datetimeFigureOut">
               <a:rPr lang="en-US" dirty="0"/>
-              <a:t>9/17/2016</a:t>
+              <a:t>9/18/2016</a:t>
             </a:fld>
             <a:endParaRPr lang="en-US" dirty="0"/>
           </a:p>
@@ -8586,7 +8586,7 @@
           <a:p>
             <a:fld id="{48A87A34-81AB-432B-8DAE-1953F412C126}" type="datetimeFigureOut">
               <a:rPr lang="en-US" dirty="0"/>
-              <a:t>9/17/2016</a:t>
+              <a:t>9/18/2016</a:t>
             </a:fld>
             <a:endParaRPr lang="en-US" dirty="0"/>
           </a:p>
@@ -8861,7 +8861,7 @@
           <a:p>
             <a:fld id="{48A87A34-81AB-432B-8DAE-1953F412C126}" type="datetimeFigureOut">
               <a:rPr lang="en-US" dirty="0"/>
-              <a:t>9/17/2016</a:t>
+              <a:t>9/18/2016</a:t>
             </a:fld>
             <a:endParaRPr lang="en-US" dirty="0"/>
           </a:p>
@@ -8971,8 +8971,8 @@
           </a:prstGeom>
           <a:noFill/>
           <a:extLst>
-            <a:ext uri="{909E8E84-426E-40dd-AFC4-6F175D3DCCD1}">
-              <a14:hiddenFill xmlns:a14="http://schemas.microsoft.com/office/drawing/2010/main" xmlns="">
+            <a:ext uri="{909E8E84-426E-40DD-AFC4-6F175D3DCCD1}">
+              <a14:hiddenFill xmlns:a14="http://schemas.microsoft.com/office/drawing/2010/main">
                 <a:solidFill>
                   <a:srgbClr val="FFFFFF"/>
                 </a:solidFill>
@@ -9045,8 +9045,8 @@
                 <a:noFill/>
               </a:ln>
               <a:extLst>
-                <a:ext uri="{91240B29-F687-4f45-9708-019B960494DF}">
-                  <a14:hiddenLine xmlns:a14="http://schemas.microsoft.com/office/drawing/2010/main" xmlns="" w="9525">
+                <a:ext uri="{91240B29-F687-4F45-9708-019B960494DF}">
+                  <a14:hiddenLine xmlns:a14="http://schemas.microsoft.com/office/drawing/2010/main" w="9525">
                     <a:solidFill>
                       <a:srgbClr val="000000"/>
                     </a:solidFill>
@@ -9135,8 +9135,8 @@
                 <a:noFill/>
               </a:ln>
               <a:extLst>
-                <a:ext uri="{91240B29-F687-4f45-9708-019B960494DF}">
-                  <a14:hiddenLine xmlns:a14="http://schemas.microsoft.com/office/drawing/2010/main" xmlns="" w="9525">
+                <a:ext uri="{91240B29-F687-4F45-9708-019B960494DF}">
+                  <a14:hiddenLine xmlns:a14="http://schemas.microsoft.com/office/drawing/2010/main" w="9525">
                     <a:solidFill>
                       <a:srgbClr val="000000"/>
                     </a:solidFill>
@@ -9225,8 +9225,8 @@
                 <a:noFill/>
               </a:ln>
               <a:extLst>
-                <a:ext uri="{91240B29-F687-4f45-9708-019B960494DF}">
-                  <a14:hiddenLine xmlns:a14="http://schemas.microsoft.com/office/drawing/2010/main" xmlns="" w="9525">
+                <a:ext uri="{91240B29-F687-4F45-9708-019B960494DF}">
+                  <a14:hiddenLine xmlns:a14="http://schemas.microsoft.com/office/drawing/2010/main" w="9525">
                     <a:solidFill>
                       <a:srgbClr val="000000"/>
                     </a:solidFill>
@@ -9287,8 +9287,8 @@
                 <a:noFill/>
               </a:ln>
               <a:extLst>
-                <a:ext uri="{91240B29-F687-4f45-9708-019B960494DF}">
-                  <a14:hiddenLine xmlns:a14="http://schemas.microsoft.com/office/drawing/2010/main" xmlns="" w="9525">
+                <a:ext uri="{91240B29-F687-4F45-9708-019B960494DF}">
+                  <a14:hiddenLine xmlns:a14="http://schemas.microsoft.com/office/drawing/2010/main" w="9525">
                     <a:solidFill>
                       <a:srgbClr val="000000"/>
                     </a:solidFill>
@@ -9377,8 +9377,8 @@
                 <a:noFill/>
               </a:ln>
               <a:extLst>
-                <a:ext uri="{91240B29-F687-4f45-9708-019B960494DF}">
-                  <a14:hiddenLine xmlns:a14="http://schemas.microsoft.com/office/drawing/2010/main" xmlns="" w="9525">
+                <a:ext uri="{91240B29-F687-4F45-9708-019B960494DF}">
+                  <a14:hiddenLine xmlns:a14="http://schemas.microsoft.com/office/drawing/2010/main" w="9525">
                     <a:solidFill>
                       <a:srgbClr val="000000"/>
                     </a:solidFill>
@@ -9439,8 +9439,8 @@
                 <a:noFill/>
               </a:ln>
               <a:extLst>
-                <a:ext uri="{91240B29-F687-4f45-9708-019B960494DF}">
-                  <a14:hiddenLine xmlns:a14="http://schemas.microsoft.com/office/drawing/2010/main" xmlns="" w="9525">
+                <a:ext uri="{91240B29-F687-4F45-9708-019B960494DF}">
+                  <a14:hiddenLine xmlns:a14="http://schemas.microsoft.com/office/drawing/2010/main" w="9525">
                     <a:solidFill>
                       <a:srgbClr val="000000"/>
                     </a:solidFill>
@@ -9501,8 +9501,8 @@
                 <a:noFill/>
               </a:ln>
               <a:extLst>
-                <a:ext uri="{91240B29-F687-4f45-9708-019B960494DF}">
-                  <a14:hiddenLine xmlns:a14="http://schemas.microsoft.com/office/drawing/2010/main" xmlns="" w="9525">
+                <a:ext uri="{91240B29-F687-4F45-9708-019B960494DF}">
+                  <a14:hiddenLine xmlns:a14="http://schemas.microsoft.com/office/drawing/2010/main" w="9525">
                     <a:solidFill>
                       <a:srgbClr val="000000"/>
                     </a:solidFill>
@@ -9591,8 +9591,8 @@
                 <a:noFill/>
               </a:ln>
               <a:extLst>
-                <a:ext uri="{91240B29-F687-4f45-9708-019B960494DF}">
-                  <a14:hiddenLine xmlns:a14="http://schemas.microsoft.com/office/drawing/2010/main" xmlns="" w="9525">
+                <a:ext uri="{91240B29-F687-4F45-9708-019B960494DF}">
+                  <a14:hiddenLine xmlns:a14="http://schemas.microsoft.com/office/drawing/2010/main" w="9525">
                     <a:solidFill>
                       <a:srgbClr val="000000"/>
                     </a:solidFill>
@@ -9681,8 +9681,8 @@
                 <a:noFill/>
               </a:ln>
               <a:extLst>
-                <a:ext uri="{91240B29-F687-4f45-9708-019B960494DF}">
-                  <a14:hiddenLine xmlns:a14="http://schemas.microsoft.com/office/drawing/2010/main" xmlns="" w="9525">
+                <a:ext uri="{91240B29-F687-4F45-9708-019B960494DF}">
+                  <a14:hiddenLine xmlns:a14="http://schemas.microsoft.com/office/drawing/2010/main" w="9525">
                     <a:solidFill>
                       <a:srgbClr val="000000"/>
                     </a:solidFill>
@@ -9743,8 +9743,8 @@
                 <a:noFill/>
               </a:ln>
               <a:extLst>
-                <a:ext uri="{91240B29-F687-4f45-9708-019B960494DF}">
-                  <a14:hiddenLine xmlns:a14="http://schemas.microsoft.com/office/drawing/2010/main" xmlns="" w="9525">
+                <a:ext uri="{91240B29-F687-4F45-9708-019B960494DF}">
+                  <a14:hiddenLine xmlns:a14="http://schemas.microsoft.com/office/drawing/2010/main" w="9525">
                     <a:solidFill>
                       <a:srgbClr val="000000"/>
                     </a:solidFill>
@@ -9853,8 +9853,8 @@
                 <a:noFill/>
               </a:ln>
               <a:extLst>
-                <a:ext uri="{91240B29-F687-4f45-9708-019B960494DF}">
-                  <a14:hiddenLine xmlns:a14="http://schemas.microsoft.com/office/drawing/2010/main" xmlns="" w="9525">
+                <a:ext uri="{91240B29-F687-4F45-9708-019B960494DF}">
+                  <a14:hiddenLine xmlns:a14="http://schemas.microsoft.com/office/drawing/2010/main" w="9525">
                     <a:solidFill>
                       <a:srgbClr val="000000"/>
                     </a:solidFill>
@@ -9937,8 +9937,8 @@
                 <a:noFill/>
               </a:ln>
               <a:extLst>
-                <a:ext uri="{91240B29-F687-4f45-9708-019B960494DF}">
-                  <a14:hiddenLine xmlns:a14="http://schemas.microsoft.com/office/drawing/2010/main" xmlns="" w="9525">
+                <a:ext uri="{91240B29-F687-4F45-9708-019B960494DF}">
+                  <a14:hiddenLine xmlns:a14="http://schemas.microsoft.com/office/drawing/2010/main" w="9525">
                     <a:solidFill>
                       <a:srgbClr val="000000"/>
                     </a:solidFill>
@@ -9999,8 +9999,8 @@
                 <a:noFill/>
               </a:ln>
               <a:extLst>
-                <a:ext uri="{91240B29-F687-4f45-9708-019B960494DF}">
-                  <a14:hiddenLine xmlns:a14="http://schemas.microsoft.com/office/drawing/2010/main" xmlns="" w="9525">
+                <a:ext uri="{91240B29-F687-4F45-9708-019B960494DF}">
+                  <a14:hiddenLine xmlns:a14="http://schemas.microsoft.com/office/drawing/2010/main" w="9525">
                     <a:solidFill>
                       <a:srgbClr val="000000"/>
                     </a:solidFill>
@@ -10061,8 +10061,8 @@
                 <a:noFill/>
               </a:ln>
               <a:extLst>
-                <a:ext uri="{91240B29-F687-4f45-9708-019B960494DF}">
-                  <a14:hiddenLine xmlns:a14="http://schemas.microsoft.com/office/drawing/2010/main" xmlns="" w="9525">
+                <a:ext uri="{91240B29-F687-4F45-9708-019B960494DF}">
+                  <a14:hiddenLine xmlns:a14="http://schemas.microsoft.com/office/drawing/2010/main" w="9525">
                     <a:solidFill>
                       <a:srgbClr val="000000"/>
                     </a:solidFill>
@@ -10151,8 +10151,8 @@
                 <a:noFill/>
               </a:ln>
               <a:extLst>
-                <a:ext uri="{91240B29-F687-4f45-9708-019B960494DF}">
-                  <a14:hiddenLine xmlns:a14="http://schemas.microsoft.com/office/drawing/2010/main" xmlns="" w="9525">
+                <a:ext uri="{91240B29-F687-4F45-9708-019B960494DF}">
+                  <a14:hiddenLine xmlns:a14="http://schemas.microsoft.com/office/drawing/2010/main" w="9525">
                     <a:solidFill>
                       <a:srgbClr val="000000"/>
                     </a:solidFill>
@@ -10185,8 +10185,8 @@
                 <a:noFill/>
               </a:ln>
               <a:extLst>
-                <a:ext uri="{91240B29-F687-4f45-9708-019B960494DF}">
-                  <a14:hiddenLine xmlns:a14="http://schemas.microsoft.com/office/drawing/2010/main" xmlns="" w="9525">
+                <a:ext uri="{91240B29-F687-4F45-9708-019B960494DF}">
+                  <a14:hiddenLine xmlns:a14="http://schemas.microsoft.com/office/drawing/2010/main" w="9525">
                     <a:solidFill>
                       <a:srgbClr val="000000"/>
                     </a:solidFill>
@@ -10250,8 +10250,8 @@
                 <a:noFill/>
               </a:ln>
               <a:extLst>
-                <a:ext uri="{91240B29-F687-4f45-9708-019B960494DF}">
-                  <a14:hiddenLine xmlns:a14="http://schemas.microsoft.com/office/drawing/2010/main" xmlns="" w="9525">
+                <a:ext uri="{91240B29-F687-4F45-9708-019B960494DF}">
+                  <a14:hiddenLine xmlns:a14="http://schemas.microsoft.com/office/drawing/2010/main" w="9525">
                     <a:solidFill>
                       <a:srgbClr val="000000"/>
                     </a:solidFill>
@@ -10340,8 +10340,8 @@
                 <a:noFill/>
               </a:ln>
               <a:extLst>
-                <a:ext uri="{91240B29-F687-4f45-9708-019B960494DF}">
-                  <a14:hiddenLine xmlns:a14="http://schemas.microsoft.com/office/drawing/2010/main" xmlns="" w="9525">
+                <a:ext uri="{91240B29-F687-4F45-9708-019B960494DF}">
+                  <a14:hiddenLine xmlns:a14="http://schemas.microsoft.com/office/drawing/2010/main" w="9525">
                     <a:solidFill>
                       <a:srgbClr val="000000"/>
                     </a:solidFill>
@@ -10402,8 +10402,8 @@
                 <a:noFill/>
               </a:ln>
               <a:extLst>
-                <a:ext uri="{91240B29-F687-4f45-9708-019B960494DF}">
-                  <a14:hiddenLine xmlns:a14="http://schemas.microsoft.com/office/drawing/2010/main" xmlns="" w="9525">
+                <a:ext uri="{91240B29-F687-4F45-9708-019B960494DF}">
+                  <a14:hiddenLine xmlns:a14="http://schemas.microsoft.com/office/drawing/2010/main" w="9525">
                     <a:solidFill>
                       <a:srgbClr val="000000"/>
                     </a:solidFill>
@@ -10492,8 +10492,8 @@
                 <a:noFill/>
               </a:ln>
               <a:extLst>
-                <a:ext uri="{91240B29-F687-4f45-9708-019B960494DF}">
-                  <a14:hiddenLine xmlns:a14="http://schemas.microsoft.com/office/drawing/2010/main" xmlns="" w="9525">
+                <a:ext uri="{91240B29-F687-4F45-9708-019B960494DF}">
+                  <a14:hiddenLine xmlns:a14="http://schemas.microsoft.com/office/drawing/2010/main" w="9525">
                     <a:solidFill>
                       <a:srgbClr val="000000"/>
                     </a:solidFill>
@@ -10557,8 +10557,8 @@
                 <a:noFill/>
               </a:ln>
               <a:extLst>
-                <a:ext uri="{91240B29-F687-4f45-9708-019B960494DF}">
-                  <a14:hiddenLine xmlns:a14="http://schemas.microsoft.com/office/drawing/2010/main" xmlns="" w="9525">
+                <a:ext uri="{91240B29-F687-4F45-9708-019B960494DF}">
+                  <a14:hiddenLine xmlns:a14="http://schemas.microsoft.com/office/drawing/2010/main" w="9525">
                     <a:solidFill>
                       <a:srgbClr val="000000"/>
                     </a:solidFill>
@@ -10619,8 +10619,8 @@
                 <a:noFill/>
               </a:ln>
               <a:extLst>
-                <a:ext uri="{91240B29-F687-4f45-9708-019B960494DF}">
-                  <a14:hiddenLine xmlns:a14="http://schemas.microsoft.com/office/drawing/2010/main" xmlns="" w="9525">
+                <a:ext uri="{91240B29-F687-4F45-9708-019B960494DF}">
+                  <a14:hiddenLine xmlns:a14="http://schemas.microsoft.com/office/drawing/2010/main" w="9525">
                     <a:solidFill>
                       <a:srgbClr val="000000"/>
                     </a:solidFill>
@@ -10709,8 +10709,8 @@
                 <a:noFill/>
               </a:ln>
               <a:extLst>
-                <a:ext uri="{91240B29-F687-4f45-9708-019B960494DF}">
-                  <a14:hiddenLine xmlns:a14="http://schemas.microsoft.com/office/drawing/2010/main" xmlns="" w="9525">
+                <a:ext uri="{91240B29-F687-4F45-9708-019B960494DF}">
+                  <a14:hiddenLine xmlns:a14="http://schemas.microsoft.com/office/drawing/2010/main" w="9525">
                     <a:solidFill>
                       <a:srgbClr val="000000"/>
                     </a:solidFill>
@@ -10799,8 +10799,8 @@
                 <a:noFill/>
               </a:ln>
               <a:extLst>
-                <a:ext uri="{91240B29-F687-4f45-9708-019B960494DF}">
-                  <a14:hiddenLine xmlns:a14="http://schemas.microsoft.com/office/drawing/2010/main" xmlns="" w="9525">
+                <a:ext uri="{91240B29-F687-4F45-9708-019B960494DF}">
+                  <a14:hiddenLine xmlns:a14="http://schemas.microsoft.com/office/drawing/2010/main" w="9525">
                     <a:solidFill>
                       <a:srgbClr val="000000"/>
                     </a:solidFill>
@@ -10864,8 +10864,8 @@
                 <a:noFill/>
               </a:ln>
               <a:extLst>
-                <a:ext uri="{91240B29-F687-4f45-9708-019B960494DF}">
-                  <a14:hiddenLine xmlns:a14="http://schemas.microsoft.com/office/drawing/2010/main" xmlns="" w="9525">
+                <a:ext uri="{91240B29-F687-4F45-9708-019B960494DF}">
+                  <a14:hiddenLine xmlns:a14="http://schemas.microsoft.com/office/drawing/2010/main" w="9525">
                     <a:solidFill>
                       <a:srgbClr val="000000"/>
                     </a:solidFill>
@@ -10984,8 +10984,8 @@
                 <a:noFill/>
               </a:ln>
               <a:extLst>
-                <a:ext uri="{91240B29-F687-4f45-9708-019B960494DF}">
-                  <a14:hiddenLine xmlns:a14="http://schemas.microsoft.com/office/drawing/2010/main" xmlns="" w="9525">
+                <a:ext uri="{91240B29-F687-4F45-9708-019B960494DF}">
+                  <a14:hiddenLine xmlns:a14="http://schemas.microsoft.com/office/drawing/2010/main" w="9525">
                     <a:solidFill>
                       <a:srgbClr val="000000"/>
                     </a:solidFill>
@@ -11082,8 +11082,8 @@
                 <a:noFill/>
               </a:ln>
               <a:extLst>
-                <a:ext uri="{91240B29-F687-4f45-9708-019B960494DF}">
-                  <a14:hiddenLine xmlns:a14="http://schemas.microsoft.com/office/drawing/2010/main" xmlns="" w="9525">
+                <a:ext uri="{91240B29-F687-4F45-9708-019B960494DF}">
+                  <a14:hiddenLine xmlns:a14="http://schemas.microsoft.com/office/drawing/2010/main" w="9525">
                     <a:solidFill>
                       <a:srgbClr val="000000"/>
                     </a:solidFill>
@@ -11197,8 +11197,8 @@
                 <a:noFill/>
               </a:ln>
               <a:extLst>
-                <a:ext uri="{91240B29-F687-4f45-9708-019B960494DF}">
-                  <a14:hiddenLine xmlns:a14="http://schemas.microsoft.com/office/drawing/2010/main" xmlns="" w="9525">
+                <a:ext uri="{91240B29-F687-4F45-9708-019B960494DF}">
+                  <a14:hiddenLine xmlns:a14="http://schemas.microsoft.com/office/drawing/2010/main" w="9525">
                     <a:solidFill>
                       <a:srgbClr val="000000"/>
                     </a:solidFill>
@@ -11287,8 +11287,8 @@
                 <a:noFill/>
               </a:ln>
               <a:extLst>
-                <a:ext uri="{91240B29-F687-4f45-9708-019B960494DF}">
-                  <a14:hiddenLine xmlns:a14="http://schemas.microsoft.com/office/drawing/2010/main" xmlns="" w="9525">
+                <a:ext uri="{91240B29-F687-4F45-9708-019B960494DF}">
+                  <a14:hiddenLine xmlns:a14="http://schemas.microsoft.com/office/drawing/2010/main" w="9525">
                     <a:solidFill>
                       <a:srgbClr val="000000"/>
                     </a:solidFill>
@@ -11352,8 +11352,8 @@
                 <a:noFill/>
               </a:ln>
               <a:extLst>
-                <a:ext uri="{91240B29-F687-4f45-9708-019B960494DF}">
-                  <a14:hiddenLine xmlns:a14="http://schemas.microsoft.com/office/drawing/2010/main" xmlns="" w="9525">
+                <a:ext uri="{91240B29-F687-4F45-9708-019B960494DF}">
+                  <a14:hiddenLine xmlns:a14="http://schemas.microsoft.com/office/drawing/2010/main" w="9525">
                     <a:solidFill>
                       <a:srgbClr val="000000"/>
                     </a:solidFill>
@@ -11442,8 +11442,8 @@
                 <a:noFill/>
               </a:ln>
               <a:extLst>
-                <a:ext uri="{91240B29-F687-4f45-9708-019B960494DF}">
-                  <a14:hiddenLine xmlns:a14="http://schemas.microsoft.com/office/drawing/2010/main" xmlns="" w="9525">
+                <a:ext uri="{91240B29-F687-4F45-9708-019B960494DF}">
+                  <a14:hiddenLine xmlns:a14="http://schemas.microsoft.com/office/drawing/2010/main" w="9525">
                     <a:solidFill>
                       <a:srgbClr val="000000"/>
                     </a:solidFill>
@@ -11510,8 +11510,8 @@
                 <a:noFill/>
               </a:ln>
               <a:extLst>
-                <a:ext uri="{91240B29-F687-4f45-9708-019B960494DF}">
-                  <a14:hiddenLine xmlns:a14="http://schemas.microsoft.com/office/drawing/2010/main" xmlns="" w="9525">
+                <a:ext uri="{91240B29-F687-4F45-9708-019B960494DF}">
+                  <a14:hiddenLine xmlns:a14="http://schemas.microsoft.com/office/drawing/2010/main" w="9525">
                     <a:solidFill>
                       <a:srgbClr val="000000"/>
                     </a:solidFill>
@@ -11600,8 +11600,8 @@
                 <a:noFill/>
               </a:ln>
               <a:extLst>
-                <a:ext uri="{91240B29-F687-4f45-9708-019B960494DF}">
-                  <a14:hiddenLine xmlns:a14="http://schemas.microsoft.com/office/drawing/2010/main" xmlns="" w="9525">
+                <a:ext uri="{91240B29-F687-4F45-9708-019B960494DF}">
+                  <a14:hiddenLine xmlns:a14="http://schemas.microsoft.com/office/drawing/2010/main" w="9525">
                     <a:solidFill>
                       <a:srgbClr val="000000"/>
                     </a:solidFill>
@@ -11668,8 +11668,8 @@
                 <a:noFill/>
               </a:ln>
               <a:extLst>
-                <a:ext uri="{91240B29-F687-4f45-9708-019B960494DF}">
-                  <a14:hiddenLine xmlns:a14="http://schemas.microsoft.com/office/drawing/2010/main" xmlns="" w="9525">
+                <a:ext uri="{91240B29-F687-4F45-9708-019B960494DF}">
+                  <a14:hiddenLine xmlns:a14="http://schemas.microsoft.com/office/drawing/2010/main" w="9525">
                     <a:solidFill>
                       <a:srgbClr val="000000"/>
                     </a:solidFill>
@@ -11758,8 +11758,8 @@
                 <a:noFill/>
               </a:ln>
               <a:extLst>
-                <a:ext uri="{91240B29-F687-4f45-9708-019B960494DF}">
-                  <a14:hiddenLine xmlns:a14="http://schemas.microsoft.com/office/drawing/2010/main" xmlns="" w="9525">
+                <a:ext uri="{91240B29-F687-4F45-9708-019B960494DF}">
+                  <a14:hiddenLine xmlns:a14="http://schemas.microsoft.com/office/drawing/2010/main" w="9525">
                     <a:solidFill>
                       <a:srgbClr val="000000"/>
                     </a:solidFill>
@@ -11792,8 +11792,8 @@
                 <a:noFill/>
               </a:ln>
               <a:extLst>
-                <a:ext uri="{91240B29-F687-4f45-9708-019B960494DF}">
-                  <a14:hiddenLine xmlns:a14="http://schemas.microsoft.com/office/drawing/2010/main" xmlns="" w="9525">
+                <a:ext uri="{91240B29-F687-4F45-9708-019B960494DF}">
+                  <a14:hiddenLine xmlns:a14="http://schemas.microsoft.com/office/drawing/2010/main" w="9525">
                     <a:solidFill>
                       <a:srgbClr val="000000"/>
                     </a:solidFill>
@@ -11934,7 +11934,7 @@
             <a:fld id="{48A87A34-81AB-432B-8DAE-1953F412C126}" type="datetimeFigureOut">
               <a:rPr lang="en-US" dirty="0"/>
               <a:pPr/>
-              <a:t>9/17/2016</a:t>
+              <a:t>9/18/2016</a:t>
             </a:fld>
             <a:endParaRPr lang="en-US" dirty="0"/>
           </a:p>
@@ -12546,8 +12546,9 @@
             <a:pPr algn="ctr"/>
             <a:r>
               <a:rPr lang="en-US" sz="3200" dirty="0" smtClean="0"/>
-              <a:t>Challenges?</a:t>
-            </a:r>
+              <a:t>Project Retrospect</a:t>
+            </a:r>
+            <a:endParaRPr lang="en-US" sz="3200" dirty="0" smtClean="0"/>
           </a:p>
           <a:p>
             <a:pPr algn="ctr"/>
@@ -14332,7 +14333,11 @@
             <a:pPr lvl="2"/>
             <a:r>
               <a:rPr lang="en-US" sz="1400" dirty="0" smtClean="0"/>
-              <a:t>Week view displays events for each day, and allows the user to see the previous or next week</a:t>
+              <a:t>Week view displays events for each day, and allows the user to see the previous or next </a:t>
+            </a:r>
+            <a:r>
+              <a:rPr lang="en-US" sz="1400" dirty="0" smtClean="0"/>
+              <a:t>week and also view a day when selected</a:t>
             </a:r>
             <a:endParaRPr lang="en-US" sz="1400" dirty="0"/>
           </a:p>
@@ -14426,13 +14431,13 @@
         </p:nvSpPr>
         <p:spPr>
           <a:xfrm>
-            <a:off x="1141412" y="1027611"/>
-            <a:ext cx="9905999" cy="4763590"/>
+            <a:off x="1141412" y="1027610"/>
+            <a:ext cx="9905999" cy="5601789"/>
           </a:xfrm>
         </p:spPr>
         <p:txBody>
           <a:bodyPr>
-            <a:normAutofit fontScale="77500" lnSpcReduction="20000"/>
+            <a:normAutofit fontScale="70000" lnSpcReduction="20000"/>
           </a:bodyPr>
           <a:lstStyle/>
           <a:p>
@@ -14501,8 +14506,13 @@
             <a:pPr lvl="2"/>
             <a:r>
               <a:rPr lang="en-US" dirty="0" smtClean="0"/>
-              <a:t>The year view would contain a list of month buttons (Jan-Dec) that would take the user to the month view of the selected year</a:t>
-            </a:r>
+              <a:t>The year view would contain a list of month buttons (Jan-Dec) that would take the user to the month view of the selected </a:t>
+            </a:r>
+            <a:r>
+              <a:rPr lang="en-US" dirty="0" smtClean="0"/>
+              <a:t>year</a:t>
+            </a:r>
+            <a:endParaRPr lang="en-US" dirty="0" smtClean="0"/>
           </a:p>
           <a:p>
             <a:pPr lvl="1"/>
@@ -14522,9 +14532,47 @@
             <a:pPr lvl="2"/>
             <a:r>
               <a:rPr lang="en-US" dirty="0" smtClean="0"/>
-              <a:t>The branch is very behind the master branch</a:t>
-            </a:r>
-            <a:endParaRPr lang="en-US" dirty="0"/>
+              <a:t>The branch is very behind the master </a:t>
+            </a:r>
+            <a:r>
+              <a:rPr lang="en-US" dirty="0" smtClean="0"/>
+              <a:t>branch</a:t>
+            </a:r>
+          </a:p>
+          <a:p>
+            <a:pPr lvl="1"/>
+            <a:r>
+              <a:rPr lang="en-US" dirty="0" smtClean="0"/>
+              <a:t>Event Search</a:t>
+            </a:r>
+          </a:p>
+          <a:p>
+            <a:pPr lvl="2"/>
+            <a:r>
+              <a:rPr lang="en-US" dirty="0" smtClean="0"/>
+              <a:t>Be able to type in a word and display all events and dates that include that word.</a:t>
+            </a:r>
+          </a:p>
+          <a:p>
+            <a:pPr lvl="1"/>
+            <a:r>
+              <a:rPr lang="en-US" dirty="0" smtClean="0"/>
+              <a:t>Problems</a:t>
+            </a:r>
+          </a:p>
+          <a:p>
+            <a:pPr lvl="2"/>
+            <a:r>
+              <a:rPr lang="en-US" dirty="0" smtClean="0"/>
+              <a:t>Did not have enough time to implement feature</a:t>
+            </a:r>
+          </a:p>
+          <a:p>
+            <a:pPr lvl="2"/>
+            <a:r>
+              <a:rPr lang="en-US" dirty="0" smtClean="0"/>
+              <a:t>Would’ve required a significantly larger amount of file I/O that we were not able to implement</a:t>
+            </a:r>
           </a:p>
         </p:txBody>
       </p:sp>
@@ -14581,7 +14629,7 @@
             <a:pPr algn="ctr"/>
             <a:r>
               <a:rPr lang="en-US" dirty="0" smtClean="0"/>
-              <a:t>Challenges?</a:t>
+              <a:t>Project retrospect</a:t>
             </a:r>
             <a:endParaRPr lang="en-US" dirty="0"/>
           </a:p>
@@ -14609,9 +14657,42 @@
           <a:p>
             <a:r>
               <a:rPr lang="en-US" dirty="0" smtClean="0"/>
-              <a:t>Stephen gets to fix this</a:t>
-            </a:r>
-            <a:endParaRPr lang="en-US" dirty="0"/>
+              <a:t>Learning </a:t>
+            </a:r>
+            <a:r>
+              <a:rPr lang="en-US" dirty="0" err="1" smtClean="0"/>
+              <a:t>JFrame</a:t>
+            </a:r>
+            <a:r>
+              <a:rPr lang="en-US" dirty="0" smtClean="0"/>
+              <a:t> and utilizing it effectively was challenging as none of us were familiar with the swing framework before the project</a:t>
+            </a:r>
+          </a:p>
+          <a:p>
+            <a:pPr lvl="1"/>
+            <a:r>
+              <a:rPr lang="en-US" dirty="0" smtClean="0"/>
+              <a:t>Separate main panel into more distinct classes for readability purposes</a:t>
+            </a:r>
+          </a:p>
+          <a:p>
+            <a:r>
+              <a:rPr lang="en-US" dirty="0" smtClean="0"/>
+              <a:t>The way we handled file I/O created difficulties that prevented us from creating a properly functional executable</a:t>
+            </a:r>
+          </a:p>
+          <a:p>
+            <a:r>
+              <a:rPr lang="en-US" dirty="0" smtClean="0"/>
+              <a:t>Adapted the project to infinite years from the beginning</a:t>
+            </a:r>
+          </a:p>
+          <a:p>
+            <a:pPr lvl="1"/>
+            <a:r>
+              <a:rPr lang="en-US" dirty="0" smtClean="0"/>
+              <a:t>Make year class January – December instead of August - May</a:t>
+            </a:r>
           </a:p>
         </p:txBody>
       </p:sp>
@@ -14695,16 +14776,124 @@
           <a:lstStyle/>
           <a:p>
             <a:r>
+              <a:rPr lang="en-US" dirty="0" err="1"/>
+              <a:t>Mazzy</a:t>
+            </a:r>
+            <a:r>
+              <a:rPr lang="en-US" dirty="0"/>
+              <a:t>, "add space between </a:t>
+            </a:r>
+            <a:r>
+              <a:rPr lang="en-US" dirty="0" err="1"/>
+              <a:t>JFrame</a:t>
+            </a:r>
+            <a:r>
+              <a:rPr lang="en-US" dirty="0"/>
+              <a:t> and </a:t>
+            </a:r>
+            <a:r>
+              <a:rPr lang="en-US" dirty="0" err="1"/>
+              <a:t>JPanel</a:t>
+            </a:r>
+            <a:r>
+              <a:rPr lang="en-US" dirty="0"/>
+              <a:t>", URL (version: 2012-01-14): 	</a:t>
+            </a:r>
+            <a:r>
               <a:rPr lang="en-US" dirty="0" smtClean="0"/>
-              <a:t>Hey </a:t>
+              <a:t>http</a:t>
+            </a:r>
+            <a:r>
+              <a:rPr lang="en-US" dirty="0"/>
+              <a:t>://</a:t>
+            </a:r>
+            <a:r>
+              <a:rPr lang="en-US" dirty="0" smtClean="0"/>
+              <a:t>stackoverflow.com/questions/8863062/add-space-between-	</a:t>
             </a:r>
             <a:r>
               <a:rPr lang="en-US" dirty="0" err="1" smtClean="0"/>
-              <a:t>yo</a:t>
+              <a:t>jframe</a:t>
             </a:r>
             <a:r>
               <a:rPr lang="en-US" dirty="0" smtClean="0"/>
-              <a:t> Stephen!</a:t>
+              <a:t>-and-</a:t>
+            </a:r>
+            <a:r>
+              <a:rPr lang="en-US" dirty="0" err="1" smtClean="0"/>
+              <a:t>jpanel</a:t>
+            </a:r>
+            <a:endParaRPr lang="en-US" dirty="0"/>
+          </a:p>
+          <a:p>
+            <a:endParaRPr lang="en-US" dirty="0"/>
+          </a:p>
+          <a:p>
+            <a:r>
+              <a:rPr lang="en-US" dirty="0" err="1"/>
+              <a:t>dododedodonl</a:t>
+            </a:r>
+            <a:r>
+              <a:rPr lang="en-US" dirty="0"/>
+              <a:t>, "</a:t>
+            </a:r>
+            <a:r>
+              <a:rPr lang="en-US" dirty="0" err="1"/>
+              <a:t>JTextArea</a:t>
+            </a:r>
+            <a:r>
+              <a:rPr lang="en-US" dirty="0"/>
+              <a:t> new line on shift + enter", URL (version </a:t>
+            </a:r>
+            <a:r>
+              <a:rPr lang="en-US" dirty="0" smtClean="0"/>
+              <a:t>2010-01-	29): http</a:t>
+            </a:r>
+            <a:r>
+              <a:rPr lang="en-US" dirty="0"/>
+              <a:t>://</a:t>
+            </a:r>
+            <a:r>
+              <a:rPr lang="en-US" dirty="0" smtClean="0"/>
+              <a:t>stackoverflow.com/questions/2162170/jtextarea-new-line-	on-shift-enter</a:t>
+            </a:r>
+            <a:endParaRPr lang="en-US" dirty="0"/>
+          </a:p>
+          <a:p>
+            <a:endParaRPr lang="en-US" dirty="0"/>
+          </a:p>
+          <a:p>
+            <a:r>
+              <a:rPr lang="en-US" dirty="0" err="1"/>
+              <a:t>Venkat</a:t>
+            </a:r>
+            <a:r>
+              <a:rPr lang="en-US" dirty="0"/>
+              <a:t>, "Align the values of the cells in </a:t>
+            </a:r>
+            <a:r>
+              <a:rPr lang="en-US" dirty="0" err="1"/>
+              <a:t>JTable</a:t>
+            </a:r>
+            <a:r>
+              <a:rPr lang="en-US" dirty="0"/>
+              <a:t>?", URL (version: 2010-03-09): 	</a:t>
+            </a:r>
+            <a:r>
+              <a:rPr lang="en-US" dirty="0" smtClean="0"/>
+              <a:t>http</a:t>
+            </a:r>
+            <a:r>
+              <a:rPr lang="en-US" dirty="0"/>
+              <a:t>://</a:t>
+            </a:r>
+            <a:r>
+              <a:rPr lang="en-US" dirty="0" smtClean="0"/>
+              <a:t>stackoverflow.com/questions/2408541/align-the-values-of-the-	cells-in-</a:t>
+            </a:r>
+            <a:r>
+              <a:rPr lang="en-US" dirty="0" err="1" smtClean="0"/>
+              <a:t>jtable</a:t>
             </a:r>
             <a:endParaRPr lang="en-US" dirty="0"/>
           </a:p>
@@ -14968,7 +15157,7 @@
   <a:extraClrSchemeLst/>
   <a:extLst>
     <a:ext uri="{05A4C25C-085E-4340-85A3-A5531E510DB2}">
-      <thm15:themeFamily xmlns:thm15="http://schemas.microsoft.com/office/thememl/2012/main" name="Circuit" id="{0AC2F7E7-15F5-431C-B2A2-456FE929F56C}" vid="{0911B802-464C-4241-8DD9-B60FF88E379F}"/>
+      <thm15:themeFamily xmlns:thm15="http://schemas.microsoft.com/office/thememl/2012/main" xmlns="" name="Circuit" id="{0AC2F7E7-15F5-431C-B2A2-456FE929F56C}" vid="{0911B802-464C-4241-8DD9-B60FF88E379F}"/>
     </a:ext>
   </a:extLst>
 </a:theme>

</xml_diff>